<commit_message>
Rolled in suggestions from Bob and Robert
</commit_message>
<xml_diff>
--- a/PLAYTV2020/matt-boles-video.pptx
+++ b/PLAYTV2020/matt-boles-video.pptx
@@ -316,7 +316,7 @@
       </p15:notesGuideLst>
     </p:ext>
     <p:ext uri="http://customooxmlschemas.google.com/">
-      <go:slidesCustomData xmlns:go="http://customooxmlschemas.google.com/" xmlns:p15="http://schemas.microsoft.com/office/powerpoint/2012/main" xmlns:p14="http://schemas.microsoft.com/office/powerpoint/2010/main" xmlns:com="http://schemas.openxmlformats.org/drawingml/2006/compatibility" xmlns:pvml="urn:schemas-microsoft-com:office:powerpoint" xmlns:v="urn:schemas-microsoft-com:vml" xmlns:o="urn:schemas-microsoft-com:office:office" xmlns:dgm="http://schemas.openxmlformats.org/drawingml/2006/diagram" xmlns:c="http://schemas.openxmlformats.org/drawingml/2006/chart" xmlns:mv="urn:schemas-microsoft-com:mac:vml" xmlns:mc="http://schemas.openxmlformats.org/markup-compatibility/2006" xmlns="" r:id="rId29" roundtripDataSignature="AMtx7mhTXUsXJMZT1PuQXuqxCJc3N1Qu9w=="/>
+      <go:slidesCustomData xmlns="" xmlns:mc="http://schemas.openxmlformats.org/markup-compatibility/2006" xmlns:mv="urn:schemas-microsoft-com:mac:vml" xmlns:c="http://schemas.openxmlformats.org/drawingml/2006/chart" xmlns:dgm="http://schemas.openxmlformats.org/drawingml/2006/diagram" xmlns:o="urn:schemas-microsoft-com:office:office" xmlns:v="urn:schemas-microsoft-com:vml" xmlns:pvml="urn:schemas-microsoft-com:office:powerpoint" xmlns:com="http://schemas.openxmlformats.org/drawingml/2006/compatibility" xmlns:p14="http://schemas.microsoft.com/office/powerpoint/2010/main" xmlns:p15="http://schemas.microsoft.com/office/powerpoint/2012/main" xmlns:go="http://customooxmlschemas.google.com/" r:id="rId29" roundtripDataSignature="AMtx7mhTXUsXJMZT1PuQXuqxCJc3N1Qu9w=="/>
     </p:ext>
   </p:extLst>
 </p:presentation>
@@ -5201,7 +5201,7 @@
         <p:fade/>
       </p:transition>
     </mc:Choice>
-    <mc:Fallback xmlns:p15="http://schemas.microsoft.com/office/powerpoint/2012/main" xmlns:com="http://schemas.openxmlformats.org/drawingml/2006/compatibility" xmlns:pvml="urn:schemas-microsoft-com:office:powerpoint" xmlns:v="urn:schemas-microsoft-com:vml" xmlns:o="urn:schemas-microsoft-com:office:office" xmlns:dgm="http://schemas.openxmlformats.org/drawingml/2006/diagram" xmlns:c="http://schemas.openxmlformats.org/drawingml/2006/chart" xmlns:mv="urn:schemas-microsoft-com:mac:vml" xmlns="">
+    <mc:Fallback xmlns="" xmlns:mv="urn:schemas-microsoft-com:mac:vml" xmlns:c="http://schemas.openxmlformats.org/drawingml/2006/chart" xmlns:dgm="http://schemas.openxmlformats.org/drawingml/2006/diagram" xmlns:o="urn:schemas-microsoft-com:office:office" xmlns:v="urn:schemas-microsoft-com:vml" xmlns:pvml="urn:schemas-microsoft-com:office:powerpoint" xmlns:com="http://schemas.openxmlformats.org/drawingml/2006/compatibility" xmlns:p15="http://schemas.microsoft.com/office/powerpoint/2012/main">
       <p:transition spd="slow">
         <p:fade/>
       </p:transition>
@@ -5601,7 +5601,7 @@
         <p:fade/>
       </p:transition>
     </mc:Choice>
-    <mc:Fallback xmlns:p15="http://schemas.microsoft.com/office/powerpoint/2012/main" xmlns:com="http://schemas.openxmlformats.org/drawingml/2006/compatibility" xmlns:pvml="urn:schemas-microsoft-com:office:powerpoint" xmlns:v="urn:schemas-microsoft-com:vml" xmlns:o="urn:schemas-microsoft-com:office:office" xmlns:dgm="http://schemas.openxmlformats.org/drawingml/2006/diagram" xmlns:c="http://schemas.openxmlformats.org/drawingml/2006/chart" xmlns:mv="urn:schemas-microsoft-com:mac:vml" xmlns="">
+    <mc:Fallback xmlns="" xmlns:mv="urn:schemas-microsoft-com:mac:vml" xmlns:c="http://schemas.openxmlformats.org/drawingml/2006/chart" xmlns:dgm="http://schemas.openxmlformats.org/drawingml/2006/diagram" xmlns:o="urn:schemas-microsoft-com:office:office" xmlns:v="urn:schemas-microsoft-com:vml" xmlns:pvml="urn:schemas-microsoft-com:office:powerpoint" xmlns:com="http://schemas.openxmlformats.org/drawingml/2006/compatibility" xmlns:p15="http://schemas.microsoft.com/office/powerpoint/2012/main">
       <p:transition spd="slow">
         <p:fade/>
       </p:transition>
@@ -6092,7 +6092,7 @@
         <p:fade/>
       </p:transition>
     </mc:Choice>
-    <mc:Fallback xmlns:p15="http://schemas.microsoft.com/office/powerpoint/2012/main" xmlns:com="http://schemas.openxmlformats.org/drawingml/2006/compatibility" xmlns:pvml="urn:schemas-microsoft-com:office:powerpoint" xmlns:v="urn:schemas-microsoft-com:vml" xmlns:o="urn:schemas-microsoft-com:office:office" xmlns:dgm="http://schemas.openxmlformats.org/drawingml/2006/diagram" xmlns:c="http://schemas.openxmlformats.org/drawingml/2006/chart" xmlns:mv="urn:schemas-microsoft-com:mac:vml" xmlns="">
+    <mc:Fallback xmlns="" xmlns:mv="urn:schemas-microsoft-com:mac:vml" xmlns:c="http://schemas.openxmlformats.org/drawingml/2006/chart" xmlns:dgm="http://schemas.openxmlformats.org/drawingml/2006/diagram" xmlns:o="urn:schemas-microsoft-com:office:office" xmlns:v="urn:schemas-microsoft-com:vml" xmlns:pvml="urn:schemas-microsoft-com:office:powerpoint" xmlns:com="http://schemas.openxmlformats.org/drawingml/2006/compatibility" xmlns:p15="http://schemas.microsoft.com/office/powerpoint/2012/main">
       <p:transition spd="slow">
         <p:fade/>
       </p:transition>
@@ -6500,7 +6500,7 @@
         <p:fade/>
       </p:transition>
     </mc:Choice>
-    <mc:Fallback xmlns:p15="http://schemas.microsoft.com/office/powerpoint/2012/main" xmlns:com="http://schemas.openxmlformats.org/drawingml/2006/compatibility" xmlns:pvml="urn:schemas-microsoft-com:office:powerpoint" xmlns:v="urn:schemas-microsoft-com:vml" xmlns:o="urn:schemas-microsoft-com:office:office" xmlns:dgm="http://schemas.openxmlformats.org/drawingml/2006/diagram" xmlns:c="http://schemas.openxmlformats.org/drawingml/2006/chart" xmlns:mv="urn:schemas-microsoft-com:mac:vml" xmlns="">
+    <mc:Fallback xmlns="" xmlns:mv="urn:schemas-microsoft-com:mac:vml" xmlns:c="http://schemas.openxmlformats.org/drawingml/2006/chart" xmlns:dgm="http://schemas.openxmlformats.org/drawingml/2006/diagram" xmlns:o="urn:schemas-microsoft-com:office:office" xmlns:v="urn:schemas-microsoft-com:vml" xmlns:pvml="urn:schemas-microsoft-com:office:powerpoint" xmlns:com="http://schemas.openxmlformats.org/drawingml/2006/compatibility" xmlns:p15="http://schemas.microsoft.com/office/powerpoint/2012/main">
       <p:transition spd="slow">
         <p:fade/>
       </p:transition>
@@ -6725,7 +6725,7 @@
         <p:fade/>
       </p:transition>
     </mc:Choice>
-    <mc:Fallback xmlns:p15="http://schemas.microsoft.com/office/powerpoint/2012/main" xmlns:com="http://schemas.openxmlformats.org/drawingml/2006/compatibility" xmlns:pvml="urn:schemas-microsoft-com:office:powerpoint" xmlns:v="urn:schemas-microsoft-com:vml" xmlns:o="urn:schemas-microsoft-com:office:office" xmlns:dgm="http://schemas.openxmlformats.org/drawingml/2006/diagram" xmlns:c="http://schemas.openxmlformats.org/drawingml/2006/chart" xmlns:mv="urn:schemas-microsoft-com:mac:vml" xmlns="">
+    <mc:Fallback xmlns="" xmlns:mv="urn:schemas-microsoft-com:mac:vml" xmlns:c="http://schemas.openxmlformats.org/drawingml/2006/chart" xmlns:dgm="http://schemas.openxmlformats.org/drawingml/2006/diagram" xmlns:o="urn:schemas-microsoft-com:office:office" xmlns:v="urn:schemas-microsoft-com:vml" xmlns:pvml="urn:schemas-microsoft-com:office:powerpoint" xmlns:com="http://schemas.openxmlformats.org/drawingml/2006/compatibility" xmlns:p15="http://schemas.microsoft.com/office/powerpoint/2012/main">
       <p:transition spd="slow">
         <p:fade/>
       </p:transition>
@@ -7110,7 +7110,7 @@
         <p:fade/>
       </p:transition>
     </mc:Choice>
-    <mc:Fallback xmlns:p15="http://schemas.microsoft.com/office/powerpoint/2012/main" xmlns:com="http://schemas.openxmlformats.org/drawingml/2006/compatibility" xmlns:pvml="urn:schemas-microsoft-com:office:powerpoint" xmlns:v="urn:schemas-microsoft-com:vml" xmlns:o="urn:schemas-microsoft-com:office:office" xmlns:dgm="http://schemas.openxmlformats.org/drawingml/2006/diagram" xmlns:c="http://schemas.openxmlformats.org/drawingml/2006/chart" xmlns:mv="urn:schemas-microsoft-com:mac:vml" xmlns="">
+    <mc:Fallback xmlns="" xmlns:mv="urn:schemas-microsoft-com:mac:vml" xmlns:c="http://schemas.openxmlformats.org/drawingml/2006/chart" xmlns:dgm="http://schemas.openxmlformats.org/drawingml/2006/diagram" xmlns:o="urn:schemas-microsoft-com:office:office" xmlns:v="urn:schemas-microsoft-com:vml" xmlns:pvml="urn:schemas-microsoft-com:office:powerpoint" xmlns:com="http://schemas.openxmlformats.org/drawingml/2006/compatibility" xmlns:p15="http://schemas.microsoft.com/office/powerpoint/2012/main">
       <p:transition spd="slow">
         <p:fade/>
       </p:transition>
@@ -8397,7 +8397,7 @@
         <p:fade/>
       </p:transition>
     </mc:Choice>
-    <mc:Fallback xmlns:p15="http://schemas.microsoft.com/office/powerpoint/2012/main" xmlns:com="http://schemas.openxmlformats.org/drawingml/2006/compatibility" xmlns:pvml="urn:schemas-microsoft-com:office:powerpoint" xmlns:v="urn:schemas-microsoft-com:vml" xmlns:o="urn:schemas-microsoft-com:office:office" xmlns:dgm="http://schemas.openxmlformats.org/drawingml/2006/diagram" xmlns:c="http://schemas.openxmlformats.org/drawingml/2006/chart" xmlns:mv="urn:schemas-microsoft-com:mac:vml" xmlns="">
+    <mc:Fallback xmlns="" xmlns:mv="urn:schemas-microsoft-com:mac:vml" xmlns:c="http://schemas.openxmlformats.org/drawingml/2006/chart" xmlns:dgm="http://schemas.openxmlformats.org/drawingml/2006/diagram" xmlns:o="urn:schemas-microsoft-com:office:office" xmlns:v="urn:schemas-microsoft-com:vml" xmlns:pvml="urn:schemas-microsoft-com:office:powerpoint" xmlns:com="http://schemas.openxmlformats.org/drawingml/2006/compatibility" xmlns:p15="http://schemas.microsoft.com/office/powerpoint/2012/main">
       <p:transition spd="slow">
         <p:fade/>
       </p:transition>
@@ -9742,7 +9742,7 @@
         <p:fade/>
       </p:transition>
     </mc:Choice>
-    <mc:Fallback xmlns:p15="http://schemas.microsoft.com/office/powerpoint/2012/main" xmlns:com="http://schemas.openxmlformats.org/drawingml/2006/compatibility" xmlns:pvml="urn:schemas-microsoft-com:office:powerpoint" xmlns:v="urn:schemas-microsoft-com:vml" xmlns:o="urn:schemas-microsoft-com:office:office" xmlns:dgm="http://schemas.openxmlformats.org/drawingml/2006/diagram" xmlns:c="http://schemas.openxmlformats.org/drawingml/2006/chart" xmlns:mv="urn:schemas-microsoft-com:mac:vml" xmlns="">
+    <mc:Fallback xmlns="" xmlns:mv="urn:schemas-microsoft-com:mac:vml" xmlns:c="http://schemas.openxmlformats.org/drawingml/2006/chart" xmlns:dgm="http://schemas.openxmlformats.org/drawingml/2006/diagram" xmlns:o="urn:schemas-microsoft-com:office:office" xmlns:v="urn:schemas-microsoft-com:vml" xmlns:pvml="urn:schemas-microsoft-com:office:powerpoint" xmlns:com="http://schemas.openxmlformats.org/drawingml/2006/compatibility" xmlns:p15="http://schemas.microsoft.com/office/powerpoint/2012/main">
       <p:transition spd="slow">
         <p:fade/>
       </p:transition>
@@ -10875,7 +10875,7 @@
         <p:fade/>
       </p:transition>
     </mc:Choice>
-    <mc:Fallback xmlns:p15="http://schemas.microsoft.com/office/powerpoint/2012/main" xmlns:com="http://schemas.openxmlformats.org/drawingml/2006/compatibility" xmlns:pvml="urn:schemas-microsoft-com:office:powerpoint" xmlns:v="urn:schemas-microsoft-com:vml" xmlns:o="urn:schemas-microsoft-com:office:office" xmlns:dgm="http://schemas.openxmlformats.org/drawingml/2006/diagram" xmlns:c="http://schemas.openxmlformats.org/drawingml/2006/chart" xmlns:mv="urn:schemas-microsoft-com:mac:vml" xmlns="">
+    <mc:Fallback xmlns="" xmlns:mv="urn:schemas-microsoft-com:mac:vml" xmlns:c="http://schemas.openxmlformats.org/drawingml/2006/chart" xmlns:dgm="http://schemas.openxmlformats.org/drawingml/2006/diagram" xmlns:o="urn:schemas-microsoft-com:office:office" xmlns:v="urn:schemas-microsoft-com:vml" xmlns:pvml="urn:schemas-microsoft-com:office:powerpoint" xmlns:com="http://schemas.openxmlformats.org/drawingml/2006/compatibility" xmlns:p15="http://schemas.microsoft.com/office/powerpoint/2012/main">
       <p:transition spd="slow">
         <p:fade/>
       </p:transition>
@@ -11025,7 +11025,7 @@
             </a:pPr>
             <a:r>
               <a:rPr lang="en-US" sz="2000" dirty="0"/>
-              <a:t>Proxy server</a:t>
+              <a:t>Proxy server (for web apps)</a:t>
             </a:r>
             <a:endParaRPr lang="en-US" dirty="0"/>
           </a:p>
@@ -11044,7 +11044,7 @@
             </a:pPr>
             <a:r>
               <a:rPr lang="en-US" sz="1800" dirty="0"/>
-              <a:t>You must setup a proxy server under your control</a:t>
+              <a:t>Server based apps can make requests directly</a:t>
             </a:r>
           </a:p>
           <a:p>
@@ -11053,7 +11053,16 @@
             </a:pPr>
             <a:r>
               <a:rPr lang="en-US" sz="1800" dirty="0"/>
-              <a:t>Demos use a PHP proxy</a:t>
+              <a:t>You must setup a proxy server under your control</a:t>
+            </a:r>
+          </a:p>
+          <a:p>
+            <a:pPr marL="971550" lvl="1" indent="-285750">
+              <a:buSzPts val="1620"/>
+            </a:pPr>
+            <a:r>
+              <a:rPr lang="en-US" sz="1800" dirty="0"/>
+              <a:t>Demos use a web app and PHP proxy</a:t>
             </a:r>
           </a:p>
           <a:p>
@@ -11088,7 +11097,7 @@
             </a:pPr>
             <a:r>
               <a:rPr lang="en-US" sz="1800" dirty="0"/>
-              <a:t>GET, PUT, POST and DELETE data</a:t>
+              <a:t>GET, PUT, POST, PATCH and DELETE data</a:t>
             </a:r>
           </a:p>
           <a:p>
@@ -11195,7 +11204,7 @@
         <p:fade/>
       </p:transition>
     </mc:Choice>
-    <mc:Fallback xmlns:p15="http://schemas.microsoft.com/office/powerpoint/2012/main" xmlns:com="http://schemas.openxmlformats.org/drawingml/2006/compatibility" xmlns:pvml="urn:schemas-microsoft-com:office:powerpoint" xmlns:v="urn:schemas-microsoft-com:vml" xmlns:o="urn:schemas-microsoft-com:office:office" xmlns:dgm="http://schemas.openxmlformats.org/drawingml/2006/diagram" xmlns:c="http://schemas.openxmlformats.org/drawingml/2006/chart" xmlns:mv="urn:schemas-microsoft-com:mac:vml" xmlns="">
+    <mc:Fallback xmlns="" xmlns:mv="urn:schemas-microsoft-com:mac:vml" xmlns:c="http://schemas.openxmlformats.org/drawingml/2006/chart" xmlns:dgm="http://schemas.openxmlformats.org/drawingml/2006/diagram" xmlns:o="urn:schemas-microsoft-com:office:office" xmlns:v="urn:schemas-microsoft-com:vml" xmlns:pvml="urn:schemas-microsoft-com:office:powerpoint" xmlns:com="http://schemas.openxmlformats.org/drawingml/2006/compatibility" xmlns:p15="http://schemas.microsoft.com/office/powerpoint/2012/main">
       <p:transition spd="slow">
         <p:fade/>
       </p:transition>
@@ -11511,7 +11520,7 @@
         <p:fade/>
       </p:transition>
     </mc:Choice>
-    <mc:Fallback xmlns:p15="http://schemas.microsoft.com/office/powerpoint/2012/main" xmlns:com="http://schemas.openxmlformats.org/drawingml/2006/compatibility" xmlns:pvml="urn:schemas-microsoft-com:office:powerpoint" xmlns:v="urn:schemas-microsoft-com:vml" xmlns:o="urn:schemas-microsoft-com:office:office" xmlns:dgm="http://schemas.openxmlformats.org/drawingml/2006/diagram" xmlns:c="http://schemas.openxmlformats.org/drawingml/2006/chart" xmlns:mv="urn:schemas-microsoft-com:mac:vml" xmlns="">
+    <mc:Fallback xmlns="" xmlns:mv="urn:schemas-microsoft-com:mac:vml" xmlns:c="http://schemas.openxmlformats.org/drawingml/2006/chart" xmlns:dgm="http://schemas.openxmlformats.org/drawingml/2006/diagram" xmlns:o="urn:schemas-microsoft-com:office:office" xmlns:v="urn:schemas-microsoft-com:vml" xmlns:pvml="urn:schemas-microsoft-com:office:powerpoint" xmlns:com="http://schemas.openxmlformats.org/drawingml/2006/compatibility" xmlns:p15="http://schemas.microsoft.com/office/powerpoint/2012/main">
       <p:transition spd="slow">
         <p:fade/>
       </p:transition>
@@ -12002,7 +12011,7 @@
         <p:fade/>
       </p:transition>
     </mc:Choice>
-    <mc:Fallback xmlns:p15="http://schemas.microsoft.com/office/powerpoint/2012/main" xmlns:com="http://schemas.openxmlformats.org/drawingml/2006/compatibility" xmlns:pvml="urn:schemas-microsoft-com:office:powerpoint" xmlns:v="urn:schemas-microsoft-com:vml" xmlns:o="urn:schemas-microsoft-com:office:office" xmlns:dgm="http://schemas.openxmlformats.org/drawingml/2006/diagram" xmlns:c="http://schemas.openxmlformats.org/drawingml/2006/chart" xmlns:mv="urn:schemas-microsoft-com:mac:vml" xmlns="">
+    <mc:Fallback xmlns="" xmlns:mv="urn:schemas-microsoft-com:mac:vml" xmlns:c="http://schemas.openxmlformats.org/drawingml/2006/chart" xmlns:dgm="http://schemas.openxmlformats.org/drawingml/2006/diagram" xmlns:o="urn:schemas-microsoft-com:office:office" xmlns:v="urn:schemas-microsoft-com:vml" xmlns:pvml="urn:schemas-microsoft-com:office:powerpoint" xmlns:com="http://schemas.openxmlformats.org/drawingml/2006/compatibility" xmlns:p15="http://schemas.microsoft.com/office/powerpoint/2012/main">
       <p:transition spd="slow">
         <p:fade/>
       </p:transition>
@@ -12403,7 +12412,7 @@
         <p:fade/>
       </p:transition>
     </mc:Choice>
-    <mc:Fallback xmlns:p15="http://schemas.microsoft.com/office/powerpoint/2012/main" xmlns:com="http://schemas.openxmlformats.org/drawingml/2006/compatibility" xmlns:pvml="urn:schemas-microsoft-com:office:powerpoint" xmlns:v="urn:schemas-microsoft-com:vml" xmlns:o="urn:schemas-microsoft-com:office:office" xmlns:dgm="http://schemas.openxmlformats.org/drawingml/2006/diagram" xmlns:c="http://schemas.openxmlformats.org/drawingml/2006/chart" xmlns:mv="urn:schemas-microsoft-com:mac:vml" xmlns="">
+    <mc:Fallback xmlns="" xmlns:mv="urn:schemas-microsoft-com:mac:vml" xmlns:c="http://schemas.openxmlformats.org/drawingml/2006/chart" xmlns:dgm="http://schemas.openxmlformats.org/drawingml/2006/diagram" xmlns:o="urn:schemas-microsoft-com:office:office" xmlns:v="urn:schemas-microsoft-com:vml" xmlns:pvml="urn:schemas-microsoft-com:office:powerpoint" xmlns:com="http://schemas.openxmlformats.org/drawingml/2006/compatibility" xmlns:p15="http://schemas.microsoft.com/office/powerpoint/2012/main">
       <p:transition spd="slow">
         <p:fade/>
       </p:transition>
@@ -12541,7 +12550,7 @@
         <p:fade/>
       </p:transition>
     </mc:Choice>
-    <mc:Fallback xmlns:p15="http://schemas.microsoft.com/office/powerpoint/2012/main" xmlns:com="http://schemas.openxmlformats.org/drawingml/2006/compatibility" xmlns:pvml="urn:schemas-microsoft-com:office:powerpoint" xmlns:v="urn:schemas-microsoft-com:vml" xmlns:o="urn:schemas-microsoft-com:office:office" xmlns:dgm="http://schemas.openxmlformats.org/drawingml/2006/diagram" xmlns:c="http://schemas.openxmlformats.org/drawingml/2006/chart" xmlns:mv="urn:schemas-microsoft-com:mac:vml" xmlns="">
+    <mc:Fallback xmlns="" xmlns:mv="urn:schemas-microsoft-com:mac:vml" xmlns:c="http://schemas.openxmlformats.org/drawingml/2006/chart" xmlns:dgm="http://schemas.openxmlformats.org/drawingml/2006/diagram" xmlns:o="urn:schemas-microsoft-com:office:office" xmlns:v="urn:schemas-microsoft-com:vml" xmlns:pvml="urn:schemas-microsoft-com:office:powerpoint" xmlns:com="http://schemas.openxmlformats.org/drawingml/2006/compatibility" xmlns:p15="http://schemas.microsoft.com/office/powerpoint/2012/main">
       <p:transition spd="slow">
         <p:fade/>
       </p:transition>
@@ -12785,7 +12794,7 @@
         <p:fade/>
       </p:transition>
     </mc:Choice>
-    <mc:Fallback xmlns:p15="http://schemas.microsoft.com/office/powerpoint/2012/main" xmlns:com="http://schemas.openxmlformats.org/drawingml/2006/compatibility" xmlns:pvml="urn:schemas-microsoft-com:office:powerpoint" xmlns:v="urn:schemas-microsoft-com:vml" xmlns:o="urn:schemas-microsoft-com:office:office" xmlns:dgm="http://schemas.openxmlformats.org/drawingml/2006/diagram" xmlns:c="http://schemas.openxmlformats.org/drawingml/2006/chart" xmlns:mv="urn:schemas-microsoft-com:mac:vml" xmlns="">
+    <mc:Fallback xmlns="" xmlns:mv="urn:schemas-microsoft-com:mac:vml" xmlns:c="http://schemas.openxmlformats.org/drawingml/2006/chart" xmlns:dgm="http://schemas.openxmlformats.org/drawingml/2006/diagram" xmlns:o="urn:schemas-microsoft-com:office:office" xmlns:v="urn:schemas-microsoft-com:vml" xmlns:pvml="urn:schemas-microsoft-com:office:powerpoint" xmlns:com="http://schemas.openxmlformats.org/drawingml/2006/compatibility" xmlns:p15="http://schemas.microsoft.com/office/powerpoint/2012/main">
       <p:transition spd="slow">
         <p:fade/>
       </p:transition>
@@ -13032,7 +13041,27 @@
                 <a:latin typeface="Source Code Pro" panose="020B0509030403020204" pitchFamily="49" charset="0"/>
                 <a:ea typeface="Source Code Pro" panose="020B0509030403020204" pitchFamily="49" charset="0"/>
               </a:rPr>
-              <a:t>  newElement.innerHTML = "Total Views: " + viewsCount;</a:t>
+              <a:t>  </a:t>
+            </a:r>
+            <a:r>
+              <a:rPr lang="en-US" sz="1800" dirty="0" err="1">
+                <a:solidFill>
+                  <a:srgbClr val="FF0000"/>
+                </a:solidFill>
+                <a:latin typeface="Source Code Pro" panose="020B0509030403020204" pitchFamily="49" charset="0"/>
+                <a:ea typeface="Source Code Pro" panose="020B0509030403020204" pitchFamily="49" charset="0"/>
+              </a:rPr>
+              <a:t>newElement.textContent</a:t>
+            </a:r>
+            <a:r>
+              <a:rPr lang="en-US" sz="1800" dirty="0">
+                <a:solidFill>
+                  <a:srgbClr val="FF0000"/>
+                </a:solidFill>
+                <a:latin typeface="Source Code Pro" panose="020B0509030403020204" pitchFamily="49" charset="0"/>
+                <a:ea typeface="Source Code Pro" panose="020B0509030403020204" pitchFamily="49" charset="0"/>
+              </a:rPr>
+              <a:t> = "Total Views: " + viewsCount;</a:t>
             </a:r>
             <a:br>
               <a:rPr lang="en-US" sz="1800" dirty="0">
@@ -13295,7 +13324,7 @@
         <p:fade/>
       </p:transition>
     </mc:Choice>
-    <mc:Fallback xmlns:p15="http://schemas.microsoft.com/office/powerpoint/2012/main" xmlns:com="http://schemas.openxmlformats.org/drawingml/2006/compatibility" xmlns:pvml="urn:schemas-microsoft-com:office:powerpoint" xmlns:v="urn:schemas-microsoft-com:vml" xmlns:o="urn:schemas-microsoft-com:office:office" xmlns:dgm="http://schemas.openxmlformats.org/drawingml/2006/diagram" xmlns:c="http://schemas.openxmlformats.org/drawingml/2006/chart" xmlns:mv="urn:schemas-microsoft-com:mac:vml" xmlns="">
+    <mc:Fallback xmlns="" xmlns:mv="urn:schemas-microsoft-com:mac:vml" xmlns:c="http://schemas.openxmlformats.org/drawingml/2006/chart" xmlns:dgm="http://schemas.openxmlformats.org/drawingml/2006/diagram" xmlns:o="urn:schemas-microsoft-com:office:office" xmlns:v="urn:schemas-microsoft-com:vml" xmlns:pvml="urn:schemas-microsoft-com:office:powerpoint" xmlns:com="http://schemas.openxmlformats.org/drawingml/2006/compatibility" xmlns:p15="http://schemas.microsoft.com/office/powerpoint/2012/main">
       <p:transition spd="slow">
         <p:fade/>
       </p:transition>
@@ -13433,7 +13462,7 @@
         <p:fade/>
       </p:transition>
     </mc:Choice>
-    <mc:Fallback xmlns:p15="http://schemas.microsoft.com/office/powerpoint/2012/main" xmlns:com="http://schemas.openxmlformats.org/drawingml/2006/compatibility" xmlns:pvml="urn:schemas-microsoft-com:office:powerpoint" xmlns:v="urn:schemas-microsoft-com:vml" xmlns:o="urn:schemas-microsoft-com:office:office" xmlns:dgm="http://schemas.openxmlformats.org/drawingml/2006/diagram" xmlns:c="http://schemas.openxmlformats.org/drawingml/2006/chart" xmlns:mv="urn:schemas-microsoft-com:mac:vml" xmlns="">
+    <mc:Fallback xmlns="" xmlns:mv="urn:schemas-microsoft-com:mac:vml" xmlns:c="http://schemas.openxmlformats.org/drawingml/2006/chart" xmlns:dgm="http://schemas.openxmlformats.org/drawingml/2006/diagram" xmlns:o="urn:schemas-microsoft-com:office:office" xmlns:v="urn:schemas-microsoft-com:vml" xmlns:pvml="urn:schemas-microsoft-com:office:powerpoint" xmlns:com="http://schemas.openxmlformats.org/drawingml/2006/compatibility" xmlns:p15="http://schemas.microsoft.com/office/powerpoint/2012/main">
       <p:transition spd="slow">
         <p:fade/>
       </p:transition>
@@ -13562,7 +13591,7 @@
             <a:pPr lvl="0"/>
             <a:r>
               <a:rPr lang="en-US" dirty="0"/>
-              <a:t>Understanding the Client Side Code</a:t>
+              <a:t>Understanding the Client-Side Code</a:t>
             </a:r>
           </a:p>
           <a:p>
@@ -13664,8 +13693,8 @@
         </p:nvSpPr>
         <p:spPr>
           <a:xfrm>
-            <a:off x="609600" y="3586881"/>
-            <a:ext cx="7279341" cy="711912"/>
+            <a:off x="609600" y="3586880"/>
+            <a:ext cx="7279341" cy="1252247"/>
           </a:xfrm>
           <a:prstGeom prst="rect">
             <a:avLst/>
@@ -13719,6 +13748,39 @@
               <a:rPr lang="en-US" dirty="0"/>
               <a:t>Bulk update video metadata</a:t>
             </a:r>
+          </a:p>
+          <a:p>
+            <a:pPr marL="347663" lvl="0" indent="-342900">
+              <a:buFont typeface="Arial" panose="020B0604020202020204" pitchFamily="34" charset="0"/>
+              <a:buChar char="•"/>
+            </a:pPr>
+            <a:r>
+              <a:rPr lang="en-US" dirty="0"/>
+              <a:t>Video engagement graph</a:t>
+            </a:r>
+          </a:p>
+          <a:p>
+            <a:pPr marL="347663" lvl="0" indent="-342900">
+              <a:buFont typeface="Arial" panose="020B0604020202020204" pitchFamily="34" charset="0"/>
+              <a:buChar char="•"/>
+            </a:pPr>
+            <a:endParaRPr lang="en-US" dirty="0"/>
+          </a:p>
+          <a:p>
+            <a:pPr marL="347663" lvl="0" indent="-342900" algn="l" rtl="0">
+              <a:lnSpc>
+                <a:spcPct val="90000"/>
+              </a:lnSpc>
+              <a:spcBef>
+                <a:spcPts val="0"/>
+              </a:spcBef>
+              <a:spcAft>
+                <a:spcPts val="0"/>
+              </a:spcAft>
+              <a:buSzPts val="2400"/>
+              <a:buFont typeface="Arial" panose="020B0604020202020204" pitchFamily="34" charset="0"/>
+              <a:buChar char="•"/>
+            </a:pPr>
             <a:endParaRPr dirty="0"/>
           </a:p>
           <a:p>
@@ -13759,7 +13821,7 @@
         <p:fade/>
       </p:transition>
     </mc:Choice>
-    <mc:Fallback xmlns:p15="http://schemas.microsoft.com/office/powerpoint/2012/main" xmlns:com="http://schemas.openxmlformats.org/drawingml/2006/compatibility" xmlns:pvml="urn:schemas-microsoft-com:office:powerpoint" xmlns:v="urn:schemas-microsoft-com:vml" xmlns:o="urn:schemas-microsoft-com:office:office" xmlns:dgm="http://schemas.openxmlformats.org/drawingml/2006/diagram" xmlns:c="http://schemas.openxmlformats.org/drawingml/2006/chart" xmlns:mv="urn:schemas-microsoft-com:mac:vml" xmlns="">
+    <mc:Fallback xmlns="" xmlns:mv="urn:schemas-microsoft-com:mac:vml" xmlns:c="http://schemas.openxmlformats.org/drawingml/2006/chart" xmlns:dgm="http://schemas.openxmlformats.org/drawingml/2006/diagram" xmlns:o="urn:schemas-microsoft-com:office:office" xmlns:v="urn:schemas-microsoft-com:vml" xmlns:pvml="urn:schemas-microsoft-com:office:powerpoint" xmlns:com="http://schemas.openxmlformats.org/drawingml/2006/compatibility" xmlns:p15="http://schemas.microsoft.com/office/powerpoint/2012/main">
       <p:transition spd="slow">
         <p:fade/>
       </p:transition>
@@ -13944,7 +14006,7 @@
         <p:fade/>
       </p:transition>
     </mc:Choice>
-    <mc:Fallback xmlns:p15="http://schemas.microsoft.com/office/powerpoint/2012/main" xmlns:com="http://schemas.openxmlformats.org/drawingml/2006/compatibility" xmlns:pvml="urn:schemas-microsoft-com:office:powerpoint" xmlns:v="urn:schemas-microsoft-com:vml" xmlns:o="urn:schemas-microsoft-com:office:office" xmlns:dgm="http://schemas.openxmlformats.org/drawingml/2006/diagram" xmlns:c="http://schemas.openxmlformats.org/drawingml/2006/chart" xmlns:mv="urn:schemas-microsoft-com:mac:vml" xmlns="">
+    <mc:Fallback xmlns="" xmlns:mv="urn:schemas-microsoft-com:mac:vml" xmlns:c="http://schemas.openxmlformats.org/drawingml/2006/chart" xmlns:dgm="http://schemas.openxmlformats.org/drawingml/2006/diagram" xmlns:o="urn:schemas-microsoft-com:office:office" xmlns:v="urn:schemas-microsoft-com:vml" xmlns:pvml="urn:schemas-microsoft-com:office:powerpoint" xmlns:com="http://schemas.openxmlformats.org/drawingml/2006/compatibility" xmlns:p15="http://schemas.microsoft.com/office/powerpoint/2012/main">
       <p:transition spd="slow">
         <p:fade/>
       </p:transition>
@@ -14149,7 +14211,7 @@
         <p:fade/>
       </p:transition>
     </mc:Choice>
-    <mc:Fallback xmlns:p15="http://schemas.microsoft.com/office/powerpoint/2012/main" xmlns:com="http://schemas.openxmlformats.org/drawingml/2006/compatibility" xmlns:pvml="urn:schemas-microsoft-com:office:powerpoint" xmlns:v="urn:schemas-microsoft-com:vml" xmlns:o="urn:schemas-microsoft-com:office:office" xmlns:dgm="http://schemas.openxmlformats.org/drawingml/2006/diagram" xmlns:c="http://schemas.openxmlformats.org/drawingml/2006/chart" xmlns:mv="urn:schemas-microsoft-com:mac:vml" xmlns="">
+    <mc:Fallback xmlns="" xmlns:mv="urn:schemas-microsoft-com:mac:vml" xmlns:c="http://schemas.openxmlformats.org/drawingml/2006/chart" xmlns:dgm="http://schemas.openxmlformats.org/drawingml/2006/diagram" xmlns:o="urn:schemas-microsoft-com:office:office" xmlns:v="urn:schemas-microsoft-com:vml" xmlns:pvml="urn:schemas-microsoft-com:office:powerpoint" xmlns:com="http://schemas.openxmlformats.org/drawingml/2006/compatibility" xmlns:p15="http://schemas.microsoft.com/office/powerpoint/2012/main">
       <p:transition spd="slow">
         <p:fade/>
       </p:transition>
@@ -14372,7 +14434,7 @@
         <p:fade/>
       </p:transition>
     </mc:Choice>
-    <mc:Fallback xmlns:p15="http://schemas.microsoft.com/office/powerpoint/2012/main" xmlns:com="http://schemas.openxmlformats.org/drawingml/2006/compatibility" xmlns:pvml="urn:schemas-microsoft-com:office:powerpoint" xmlns:v="urn:schemas-microsoft-com:vml" xmlns:o="urn:schemas-microsoft-com:office:office" xmlns:dgm="http://schemas.openxmlformats.org/drawingml/2006/diagram" xmlns:c="http://schemas.openxmlformats.org/drawingml/2006/chart" xmlns:mv="urn:schemas-microsoft-com:mac:vml" xmlns="">
+    <mc:Fallback xmlns="" xmlns:mv="urn:schemas-microsoft-com:mac:vml" xmlns:c="http://schemas.openxmlformats.org/drawingml/2006/chart" xmlns:dgm="http://schemas.openxmlformats.org/drawingml/2006/diagram" xmlns:o="urn:schemas-microsoft-com:office:office" xmlns:v="urn:schemas-microsoft-com:vml" xmlns:pvml="urn:schemas-microsoft-com:office:powerpoint" xmlns:com="http://schemas.openxmlformats.org/drawingml/2006/compatibility" xmlns:p15="http://schemas.microsoft.com/office/powerpoint/2012/main">
       <p:transition spd="slow">
         <p:fade/>
       </p:transition>
@@ -14657,7 +14719,7 @@
         <p:fade/>
       </p:transition>
     </mc:Choice>
-    <mc:Fallback xmlns:p15="http://schemas.microsoft.com/office/powerpoint/2012/main" xmlns:com="http://schemas.openxmlformats.org/drawingml/2006/compatibility" xmlns:pvml="urn:schemas-microsoft-com:office:powerpoint" xmlns:v="urn:schemas-microsoft-com:vml" xmlns:o="urn:schemas-microsoft-com:office:office" xmlns:dgm="http://schemas.openxmlformats.org/drawingml/2006/diagram" xmlns:c="http://schemas.openxmlformats.org/drawingml/2006/chart" xmlns:mv="urn:schemas-microsoft-com:mac:vml" xmlns="">
+    <mc:Fallback xmlns="" xmlns:mv="urn:schemas-microsoft-com:mac:vml" xmlns:c="http://schemas.openxmlformats.org/drawingml/2006/chart" xmlns:dgm="http://schemas.openxmlformats.org/drawingml/2006/diagram" xmlns:o="urn:schemas-microsoft-com:office:office" xmlns:v="urn:schemas-microsoft-com:vml" xmlns:pvml="urn:schemas-microsoft-com:office:powerpoint" xmlns:com="http://schemas.openxmlformats.org/drawingml/2006/compatibility" xmlns:p15="http://schemas.microsoft.com/office/powerpoint/2012/main">
       <p:transition spd="slow">
         <p:fade/>
       </p:transition>
@@ -14694,7 +14756,7 @@
         <p:fade/>
       </p:transition>
     </mc:Choice>
-    <mc:Fallback xmlns:p15="http://schemas.microsoft.com/office/powerpoint/2012/main" xmlns:com="http://schemas.openxmlformats.org/drawingml/2006/compatibility" xmlns:pvml="urn:schemas-microsoft-com:office:powerpoint" xmlns:v="urn:schemas-microsoft-com:vml" xmlns:o="urn:schemas-microsoft-com:office:office" xmlns:dgm="http://schemas.openxmlformats.org/drawingml/2006/diagram" xmlns:c="http://schemas.openxmlformats.org/drawingml/2006/chart" xmlns:mv="urn:schemas-microsoft-com:mac:vml" xmlns="">
+    <mc:Fallback xmlns="" xmlns:mv="urn:schemas-microsoft-com:mac:vml" xmlns:c="http://schemas.openxmlformats.org/drawingml/2006/chart" xmlns:dgm="http://schemas.openxmlformats.org/drawingml/2006/diagram" xmlns:o="urn:schemas-microsoft-com:office:office" xmlns:v="urn:schemas-microsoft-com:vml" xmlns:pvml="urn:schemas-microsoft-com:office:powerpoint" xmlns:com="http://schemas.openxmlformats.org/drawingml/2006/compatibility" xmlns:p15="http://schemas.microsoft.com/office/powerpoint/2012/main">
       <p:transition spd="slow">
         <p:fade/>
       </p:transition>
@@ -14862,7 +14924,7 @@
         <p:fade/>
       </p:transition>
     </mc:Choice>
-    <mc:Fallback xmlns:p15="http://schemas.microsoft.com/office/powerpoint/2012/main" xmlns:com="http://schemas.openxmlformats.org/drawingml/2006/compatibility" xmlns:pvml="urn:schemas-microsoft-com:office:powerpoint" xmlns:v="urn:schemas-microsoft-com:vml" xmlns:o="urn:schemas-microsoft-com:office:office" xmlns:dgm="http://schemas.openxmlformats.org/drawingml/2006/diagram" xmlns:c="http://schemas.openxmlformats.org/drawingml/2006/chart" xmlns:mv="urn:schemas-microsoft-com:mac:vml" xmlns="">
+    <mc:Fallback xmlns="" xmlns:mv="urn:schemas-microsoft-com:mac:vml" xmlns:c="http://schemas.openxmlformats.org/drawingml/2006/chart" xmlns:dgm="http://schemas.openxmlformats.org/drawingml/2006/diagram" xmlns:o="urn:schemas-microsoft-com:office:office" xmlns:v="urn:schemas-microsoft-com:vml" xmlns:pvml="urn:schemas-microsoft-com:office:powerpoint" xmlns:com="http://schemas.openxmlformats.org/drawingml/2006/compatibility" xmlns:p15="http://schemas.microsoft.com/office/powerpoint/2012/main">
       <p:transition spd="slow">
         <p:fade/>
       </p:transition>
@@ -15020,7 +15082,14 @@
             <a:pPr marL="971550" lvl="1" indent="-285750"/>
             <a:r>
               <a:rPr lang="en-US" sz="1600" dirty="0"/>
-              <a:t>Uses HTTP requests to GET, PUT, POST and DELETE data</a:t>
+              <a:t>Uses HTTP requests to GET, PUT, POST, PATCH and DELETE data</a:t>
+            </a:r>
+          </a:p>
+          <a:p>
+            <a:pPr marL="971550" lvl="1" indent="-285750"/>
+            <a:r>
+              <a:rPr lang="en-US" sz="1600" dirty="0"/>
+              <a:t>Request and response bodies are usually in JSON format</a:t>
             </a:r>
           </a:p>
           <a:p>
@@ -15134,7 +15203,7 @@
         <p:fade/>
       </p:transition>
     </mc:Choice>
-    <mc:Fallback xmlns:p15="http://schemas.microsoft.com/office/powerpoint/2012/main" xmlns:com="http://schemas.openxmlformats.org/drawingml/2006/compatibility" xmlns:pvml="urn:schemas-microsoft-com:office:powerpoint" xmlns:v="urn:schemas-microsoft-com:vml" xmlns:o="urn:schemas-microsoft-com:office:office" xmlns:dgm="http://schemas.openxmlformats.org/drawingml/2006/diagram" xmlns:c="http://schemas.openxmlformats.org/drawingml/2006/chart" xmlns:mv="urn:schemas-microsoft-com:mac:vml" xmlns="">
+    <mc:Fallback xmlns="" xmlns:mv="urn:schemas-microsoft-com:mac:vml" xmlns:c="http://schemas.openxmlformats.org/drawingml/2006/chart" xmlns:dgm="http://schemas.openxmlformats.org/drawingml/2006/diagram" xmlns:o="urn:schemas-microsoft-com:office:office" xmlns:v="urn:schemas-microsoft-com:vml" xmlns:pvml="urn:schemas-microsoft-com:office:powerpoint" xmlns:com="http://schemas.openxmlformats.org/drawingml/2006/compatibility" xmlns:p15="http://schemas.microsoft.com/office/powerpoint/2012/main">
       <p:transition spd="slow">
         <p:fade/>
       </p:transition>
@@ -15347,7 +15416,7 @@
         <p:fade/>
       </p:transition>
     </mc:Choice>
-    <mc:Fallback xmlns:p15="http://schemas.microsoft.com/office/powerpoint/2012/main" xmlns:com="http://schemas.openxmlformats.org/drawingml/2006/compatibility" xmlns:pvml="urn:schemas-microsoft-com:office:powerpoint" xmlns:v="urn:schemas-microsoft-com:vml" xmlns:o="urn:schemas-microsoft-com:office:office" xmlns:dgm="http://schemas.openxmlformats.org/drawingml/2006/diagram" xmlns:c="http://schemas.openxmlformats.org/drawingml/2006/chart" xmlns:mv="urn:schemas-microsoft-com:mac:vml" xmlns="">
+    <mc:Fallback xmlns="" xmlns:mv="urn:schemas-microsoft-com:mac:vml" xmlns:c="http://schemas.openxmlformats.org/drawingml/2006/chart" xmlns:dgm="http://schemas.openxmlformats.org/drawingml/2006/diagram" xmlns:o="urn:schemas-microsoft-com:office:office" xmlns:v="urn:schemas-microsoft-com:vml" xmlns:pvml="urn:schemas-microsoft-com:office:powerpoint" xmlns:com="http://schemas.openxmlformats.org/drawingml/2006/compatibility" xmlns:p15="http://schemas.microsoft.com/office/powerpoint/2012/main">
       <p:transition spd="slow">
         <p:fade/>
       </p:transition>
@@ -15407,42 +15476,56 @@
             </a:pPr>
             <a:r>
               <a:rPr lang="en-US" sz="2000" dirty="0"/>
-              <a:t>Use cases</a:t>
+              <a:t>General use cases</a:t>
             </a:r>
           </a:p>
           <a:p>
             <a:pPr marL="971550" lvl="1" indent="-285750"/>
             <a:r>
               <a:rPr lang="en-US" sz="1600" dirty="0"/>
-              <a:t>General: Searching to build custom reports/playlists</a:t>
+              <a:t>Searching to build custom reports/playlists</a:t>
             </a:r>
           </a:p>
           <a:p>
             <a:pPr marL="971550" lvl="1" indent="-285750"/>
             <a:r>
               <a:rPr lang="en-US" sz="1600" dirty="0"/>
-              <a:t>General: Combine functionality from multiple REST APIs</a:t>
+              <a:t>Combine functionality from multiple REST APIs</a:t>
             </a:r>
           </a:p>
           <a:p>
             <a:pPr marL="971550" lvl="1" indent="-285750"/>
             <a:r>
               <a:rPr lang="en-US" sz="1600" dirty="0"/>
-              <a:t>Specific: Build a playlist from the newest videos </a:t>
+              <a:t>Integrating systems (such as Video Cloud with a CMS)</a:t>
+            </a:r>
+          </a:p>
+          <a:p>
+            <a:pPr marL="514350" indent="-285750"/>
+            <a:r>
+              <a:rPr lang="en-US" sz="2000" dirty="0"/>
+              <a:t>Specific use cases</a:t>
             </a:r>
           </a:p>
           <a:p>
             <a:pPr marL="971550" lvl="1" indent="-285750"/>
             <a:r>
               <a:rPr lang="en-US" sz="1600" dirty="0"/>
-              <a:t>Specific: Get analytics by playlist</a:t>
+              <a:t>Build a playlist from the newest videos </a:t>
             </a:r>
           </a:p>
           <a:p>
             <a:pPr marL="971550" lvl="1" indent="-285750"/>
             <a:r>
               <a:rPr lang="en-US" sz="1600" dirty="0"/>
-              <a:t>Specific: Retrieve data and display in player</a:t>
+              <a:t>Get analytics by playlist</a:t>
+            </a:r>
+          </a:p>
+          <a:p>
+            <a:pPr marL="971550" lvl="1" indent="-285750"/>
+            <a:r>
+              <a:rPr lang="en-US" sz="1600" dirty="0"/>
+              <a:t>Retrieve data and display in player</a:t>
             </a:r>
           </a:p>
         </p:txBody>
@@ -15529,7 +15612,7 @@
         <p:fade/>
       </p:transition>
     </mc:Choice>
-    <mc:Fallback xmlns:p15="http://schemas.microsoft.com/office/powerpoint/2012/main" xmlns:com="http://schemas.openxmlformats.org/drawingml/2006/compatibility" xmlns:pvml="urn:schemas-microsoft-com:office:powerpoint" xmlns:v="urn:schemas-microsoft-com:vml" xmlns:o="urn:schemas-microsoft-com:office:office" xmlns:dgm="http://schemas.openxmlformats.org/drawingml/2006/diagram" xmlns:c="http://schemas.openxmlformats.org/drawingml/2006/chart" xmlns:mv="urn:schemas-microsoft-com:mac:vml" xmlns="">
+    <mc:Fallback xmlns="" xmlns:mv="urn:schemas-microsoft-com:mac:vml" xmlns:c="http://schemas.openxmlformats.org/drawingml/2006/chart" xmlns:dgm="http://schemas.openxmlformats.org/drawingml/2006/diagram" xmlns:o="urn:schemas-microsoft-com:office:office" xmlns:v="urn:schemas-microsoft-com:vml" xmlns:pvml="urn:schemas-microsoft-com:office:powerpoint" xmlns:com="http://schemas.openxmlformats.org/drawingml/2006/compatibility" xmlns:p15="http://schemas.microsoft.com/office/powerpoint/2012/main">
       <p:transition spd="slow">
         <p:fade/>
       </p:transition>
@@ -15819,7 +15902,7 @@
         <p:fade/>
       </p:transition>
     </mc:Choice>
-    <mc:Fallback xmlns:p15="http://schemas.microsoft.com/office/powerpoint/2012/main" xmlns:com="http://schemas.openxmlformats.org/drawingml/2006/compatibility" xmlns:pvml="urn:schemas-microsoft-com:office:powerpoint" xmlns:v="urn:schemas-microsoft-com:vml" xmlns:o="urn:schemas-microsoft-com:office:office" xmlns:dgm="http://schemas.openxmlformats.org/drawingml/2006/diagram" xmlns:c="http://schemas.openxmlformats.org/drawingml/2006/chart" xmlns:mv="urn:schemas-microsoft-com:mac:vml" xmlns="">
+    <mc:Fallback xmlns="" xmlns:mv="urn:schemas-microsoft-com:mac:vml" xmlns:c="http://schemas.openxmlformats.org/drawingml/2006/chart" xmlns:dgm="http://schemas.openxmlformats.org/drawingml/2006/diagram" xmlns:o="urn:schemas-microsoft-com:office:office" xmlns:v="urn:schemas-microsoft-com:vml" xmlns:pvml="urn:schemas-microsoft-com:office:powerpoint" xmlns:com="http://schemas.openxmlformats.org/drawingml/2006/compatibility" xmlns:p15="http://schemas.microsoft.com/office/powerpoint/2012/main">
       <p:transition spd="slow">
         <p:fade/>
       </p:transition>
@@ -16040,7 +16123,7 @@
         <p:fade/>
       </p:transition>
     </mc:Choice>
-    <mc:Fallback xmlns:p15="http://schemas.microsoft.com/office/powerpoint/2012/main" xmlns:com="http://schemas.openxmlformats.org/drawingml/2006/compatibility" xmlns:pvml="urn:schemas-microsoft-com:office:powerpoint" xmlns:v="urn:schemas-microsoft-com:vml" xmlns:o="urn:schemas-microsoft-com:office:office" xmlns:dgm="http://schemas.openxmlformats.org/drawingml/2006/diagram" xmlns:c="http://schemas.openxmlformats.org/drawingml/2006/chart" xmlns:mv="urn:schemas-microsoft-com:mac:vml" xmlns="">
+    <mc:Fallback xmlns="" xmlns:mv="urn:schemas-microsoft-com:mac:vml" xmlns:c="http://schemas.openxmlformats.org/drawingml/2006/chart" xmlns:dgm="http://schemas.openxmlformats.org/drawingml/2006/diagram" xmlns:o="urn:schemas-microsoft-com:office:office" xmlns:v="urn:schemas-microsoft-com:vml" xmlns:pvml="urn:schemas-microsoft-com:office:powerpoint" xmlns:com="http://schemas.openxmlformats.org/drawingml/2006/compatibility" xmlns:p15="http://schemas.microsoft.com/office/powerpoint/2012/main">
       <p:transition spd="slow">
         <p:fade/>
       </p:transition>
@@ -16199,7 +16282,7 @@
         <p:fade/>
       </p:transition>
     </mc:Choice>
-    <mc:Fallback xmlns:p15="http://schemas.microsoft.com/office/powerpoint/2012/main" xmlns:com="http://schemas.openxmlformats.org/drawingml/2006/compatibility" xmlns:pvml="urn:schemas-microsoft-com:office:powerpoint" xmlns:v="urn:schemas-microsoft-com:vml" xmlns:o="urn:schemas-microsoft-com:office:office" xmlns:dgm="http://schemas.openxmlformats.org/drawingml/2006/diagram" xmlns:c="http://schemas.openxmlformats.org/drawingml/2006/chart" xmlns:mv="urn:schemas-microsoft-com:mac:vml" xmlns="">
+    <mc:Fallback xmlns="" xmlns:mv="urn:schemas-microsoft-com:mac:vml" xmlns:c="http://schemas.openxmlformats.org/drawingml/2006/chart" xmlns:dgm="http://schemas.openxmlformats.org/drawingml/2006/diagram" xmlns:o="urn:schemas-microsoft-com:office:office" xmlns:v="urn:schemas-microsoft-com:vml" xmlns:pvml="urn:schemas-microsoft-com:office:powerpoint" xmlns:com="http://schemas.openxmlformats.org/drawingml/2006/compatibility" xmlns:p15="http://schemas.microsoft.com/office/powerpoint/2012/main">
       <p:transition spd="slow">
         <p:fade/>
       </p:transition>

</xml_diff>